<commit_message>
updated final project powerpoint
</commit_message>
<xml_diff>
--- a/Ticket System Microservice Project - May 2025.pptx
+++ b/Ticket System Microservice Project - May 2025.pptx
@@ -8771,8 +8771,8 @@
         </p:blipFill>
         <p:spPr>
           <a:xfrm>
-            <a:off x="4011266" y="919375"/>
-            <a:ext cx="4380120" cy="4071724"/>
+            <a:off x="4033468" y="766975"/>
+            <a:ext cx="4738280" cy="4568200"/>
           </a:xfrm>
           <a:prstGeom prst="rect">
             <a:avLst/>

</xml_diff>